<commit_message>
README updated 0.4 -  transferrer cleanses CSV data
</commit_message>
<xml_diff>
--- a/app-bucket/content/img/pics-2021.pptx
+++ b/app-bucket/content/img/pics-2021.pptx
@@ -243,7 +243,7 @@
           <a:p>
             <a:fld id="{AE012AFE-1FD2-420A-8FDC-B1463C197541}" type="datetimeFigureOut">
               <a:rPr lang="de-DE" smtClean="0"/>
-              <a:t>25.02.2021</a:t>
+              <a:t>14.03.2021</a:t>
             </a:fld>
             <a:endParaRPr lang="de-DE"/>
           </a:p>
@@ -413,7 +413,7 @@
           <a:p>
             <a:fld id="{AE012AFE-1FD2-420A-8FDC-B1463C197541}" type="datetimeFigureOut">
               <a:rPr lang="de-DE" smtClean="0"/>
-              <a:t>25.02.2021</a:t>
+              <a:t>14.03.2021</a:t>
             </a:fld>
             <a:endParaRPr lang="de-DE"/>
           </a:p>
@@ -593,7 +593,7 @@
           <a:p>
             <a:fld id="{AE012AFE-1FD2-420A-8FDC-B1463C197541}" type="datetimeFigureOut">
               <a:rPr lang="de-DE" smtClean="0"/>
-              <a:t>25.02.2021</a:t>
+              <a:t>14.03.2021</a:t>
             </a:fld>
             <a:endParaRPr lang="de-DE"/>
           </a:p>
@@ -763,7 +763,7 @@
           <a:p>
             <a:fld id="{AE012AFE-1FD2-420A-8FDC-B1463C197541}" type="datetimeFigureOut">
               <a:rPr lang="de-DE" smtClean="0"/>
-              <a:t>25.02.2021</a:t>
+              <a:t>14.03.2021</a:t>
             </a:fld>
             <a:endParaRPr lang="de-DE"/>
           </a:p>
@@ -1009,7 +1009,7 @@
           <a:p>
             <a:fld id="{AE012AFE-1FD2-420A-8FDC-B1463C197541}" type="datetimeFigureOut">
               <a:rPr lang="de-DE" smtClean="0"/>
-              <a:t>25.02.2021</a:t>
+              <a:t>14.03.2021</a:t>
             </a:fld>
             <a:endParaRPr lang="de-DE"/>
           </a:p>
@@ -1241,7 +1241,7 @@
           <a:p>
             <a:fld id="{AE012AFE-1FD2-420A-8FDC-B1463C197541}" type="datetimeFigureOut">
               <a:rPr lang="de-DE" smtClean="0"/>
-              <a:t>25.02.2021</a:t>
+              <a:t>14.03.2021</a:t>
             </a:fld>
             <a:endParaRPr lang="de-DE"/>
           </a:p>
@@ -1608,7 +1608,7 @@
           <a:p>
             <a:fld id="{AE012AFE-1FD2-420A-8FDC-B1463C197541}" type="datetimeFigureOut">
               <a:rPr lang="de-DE" smtClean="0"/>
-              <a:t>25.02.2021</a:t>
+              <a:t>14.03.2021</a:t>
             </a:fld>
             <a:endParaRPr lang="de-DE"/>
           </a:p>
@@ -1726,7 +1726,7 @@
           <a:p>
             <a:fld id="{AE012AFE-1FD2-420A-8FDC-B1463C197541}" type="datetimeFigureOut">
               <a:rPr lang="de-DE" smtClean="0"/>
-              <a:t>25.02.2021</a:t>
+              <a:t>14.03.2021</a:t>
             </a:fld>
             <a:endParaRPr lang="de-DE"/>
           </a:p>
@@ -1821,7 +1821,7 @@
           <a:p>
             <a:fld id="{AE012AFE-1FD2-420A-8FDC-B1463C197541}" type="datetimeFigureOut">
               <a:rPr lang="de-DE" smtClean="0"/>
-              <a:t>25.02.2021</a:t>
+              <a:t>14.03.2021</a:t>
             </a:fld>
             <a:endParaRPr lang="de-DE"/>
           </a:p>
@@ -2098,7 +2098,7 @@
           <a:p>
             <a:fld id="{AE012AFE-1FD2-420A-8FDC-B1463C197541}" type="datetimeFigureOut">
               <a:rPr lang="de-DE" smtClean="0"/>
-              <a:t>25.02.2021</a:t>
+              <a:t>14.03.2021</a:t>
             </a:fld>
             <a:endParaRPr lang="de-DE"/>
           </a:p>
@@ -2351,7 +2351,7 @@
           <a:p>
             <a:fld id="{AE012AFE-1FD2-420A-8FDC-B1463C197541}" type="datetimeFigureOut">
               <a:rPr lang="de-DE" smtClean="0"/>
-              <a:t>25.02.2021</a:t>
+              <a:t>14.03.2021</a:t>
             </a:fld>
             <a:endParaRPr lang="de-DE"/>
           </a:p>
@@ -2564,7 +2564,7 @@
           <a:p>
             <a:fld id="{AE012AFE-1FD2-420A-8FDC-B1463C197541}" type="datetimeFigureOut">
               <a:rPr lang="de-DE" smtClean="0"/>
-              <a:t>25.02.2021</a:t>
+              <a:t>14.03.2021</a:t>
             </a:fld>
             <a:endParaRPr lang="de-DE"/>
           </a:p>
@@ -3071,8 +3071,8 @@
         </p:nvSpPr>
         <p:spPr>
           <a:xfrm>
-            <a:off x="3280611" y="2141621"/>
-            <a:ext cx="2173703" cy="892092"/>
+            <a:off x="3280611" y="2141620"/>
+            <a:ext cx="2173703" cy="1009249"/>
           </a:xfrm>
           <a:prstGeom prst="rect">
             <a:avLst/>
@@ -3122,8 +3122,8 @@
         </p:nvSpPr>
         <p:spPr>
           <a:xfrm>
-            <a:off x="3337762" y="2184483"/>
-            <a:ext cx="1162802" cy="382505"/>
+            <a:off x="3360585" y="2218773"/>
+            <a:ext cx="1120549" cy="428976"/>
           </a:xfrm>
           <a:prstGeom prst="rect">
             <a:avLst/>
@@ -3173,8 +3173,8 @@
         </p:nvSpPr>
         <p:spPr>
           <a:xfrm>
-            <a:off x="3371849" y="2212908"/>
-            <a:ext cx="667400" cy="325651"/>
+            <a:off x="3407689" y="2258504"/>
+            <a:ext cx="546677" cy="328694"/>
           </a:xfrm>
           <a:prstGeom prst="rect">
             <a:avLst/>
@@ -3224,8 +3224,8 @@
         </p:nvSpPr>
         <p:spPr>
           <a:xfrm>
-            <a:off x="4065002" y="2212909"/>
-            <a:ext cx="409809" cy="325651"/>
+            <a:off x="4092241" y="2258505"/>
+            <a:ext cx="335682" cy="328694"/>
           </a:xfrm>
           <a:prstGeom prst="rect">
             <a:avLst/>
@@ -3275,8 +3275,8 @@
         </p:nvSpPr>
         <p:spPr>
           <a:xfrm>
-            <a:off x="4543638" y="2184483"/>
-            <a:ext cx="867602" cy="382505"/>
+            <a:off x="4554864" y="2218773"/>
+            <a:ext cx="836076" cy="428976"/>
           </a:xfrm>
           <a:prstGeom prst="rect">
             <a:avLst/>
@@ -3326,8 +3326,8 @@
         </p:nvSpPr>
         <p:spPr>
           <a:xfrm>
-            <a:off x="4577724" y="2212908"/>
-            <a:ext cx="352500" cy="325651"/>
+            <a:off x="4603058" y="2258504"/>
+            <a:ext cx="288737" cy="328694"/>
           </a:xfrm>
           <a:prstGeom prst="rect">
             <a:avLst/>
@@ -3377,8 +3377,8 @@
         </p:nvSpPr>
         <p:spPr>
           <a:xfrm>
-            <a:off x="4964311" y="2212907"/>
-            <a:ext cx="409809" cy="325651"/>
+            <a:off x="4991550" y="2258503"/>
+            <a:ext cx="335682" cy="328694"/>
           </a:xfrm>
           <a:prstGeom prst="rect">
             <a:avLst/>
@@ -3428,8 +3428,8 @@
         </p:nvSpPr>
         <p:spPr>
           <a:xfrm>
-            <a:off x="4247777" y="2607594"/>
-            <a:ext cx="1162802" cy="382505"/>
+            <a:off x="4270601" y="2724901"/>
+            <a:ext cx="1120339" cy="345958"/>
           </a:xfrm>
           <a:prstGeom prst="rect">
             <a:avLst/>
@@ -3479,8 +3479,8 @@
         </p:nvSpPr>
         <p:spPr>
           <a:xfrm>
-            <a:off x="4281864" y="2636019"/>
-            <a:ext cx="667400" cy="325651"/>
+            <a:off x="4317704" y="2768085"/>
+            <a:ext cx="546575" cy="265083"/>
           </a:xfrm>
           <a:prstGeom prst="rect">
             <a:avLst/>
@@ -3530,8 +3530,8 @@
         </p:nvSpPr>
         <p:spPr>
           <a:xfrm>
-            <a:off x="4975017" y="2636020"/>
-            <a:ext cx="409809" cy="325651"/>
+            <a:off x="5002256" y="2768086"/>
+            <a:ext cx="335619" cy="265083"/>
           </a:xfrm>
           <a:prstGeom prst="rect">
             <a:avLst/>
@@ -3581,8 +3581,8 @@
         </p:nvSpPr>
         <p:spPr>
           <a:xfrm>
-            <a:off x="3336440" y="2607595"/>
-            <a:ext cx="867602" cy="382505"/>
+            <a:off x="3347666" y="2724902"/>
+            <a:ext cx="835919" cy="345958"/>
           </a:xfrm>
           <a:prstGeom prst="rect">
             <a:avLst/>
@@ -3632,8 +3632,8 @@
         </p:nvSpPr>
         <p:spPr>
           <a:xfrm>
-            <a:off x="3370526" y="2636020"/>
-            <a:ext cx="352500" cy="325651"/>
+            <a:off x="3395860" y="2768086"/>
+            <a:ext cx="288683" cy="265083"/>
           </a:xfrm>
           <a:prstGeom prst="rect">
             <a:avLst/>
@@ -3683,8 +3683,8 @@
         </p:nvSpPr>
         <p:spPr>
           <a:xfrm>
-            <a:off x="3757113" y="2636019"/>
-            <a:ext cx="409809" cy="325651"/>
+            <a:off x="3784352" y="2768085"/>
+            <a:ext cx="335619" cy="265083"/>
           </a:xfrm>
           <a:prstGeom prst="rect">
             <a:avLst/>
@@ -3734,13 +3734,13 @@
         </p:nvSpPr>
         <p:spPr>
           <a:xfrm>
-            <a:off x="3066667" y="1423988"/>
+            <a:off x="2654968" y="1423988"/>
             <a:ext cx="771908" cy="334252"/>
           </a:xfrm>
           <a:prstGeom prst="wedgeRectCallout">
             <a:avLst>
-              <a:gd name="adj1" fmla="val -14493"/>
-              <a:gd name="adj2" fmla="val 163179"/>
+              <a:gd name="adj1" fmla="val 37333"/>
+              <a:gd name="adj2" fmla="val 179137"/>
             </a:avLst>
           </a:prstGeom>
           <a:solidFill>
@@ -3856,13 +3856,13 @@
         </p:nvSpPr>
         <p:spPr>
           <a:xfrm>
-            <a:off x="3975553" y="1423988"/>
+            <a:off x="3706287" y="1423988"/>
             <a:ext cx="771908" cy="334252"/>
           </a:xfrm>
           <a:prstGeom prst="wedgeRectCallout">
             <a:avLst>
-              <a:gd name="adj1" fmla="val -50895"/>
-              <a:gd name="adj2" fmla="val 174577"/>
+              <a:gd name="adj1" fmla="val -86434"/>
+              <a:gd name="adj2" fmla="val 189395"/>
             </a:avLst>
           </a:prstGeom>
           <a:solidFill>
@@ -3983,8 +3983,8 @@
           </a:xfrm>
           <a:prstGeom prst="wedgeRectCallout">
             <a:avLst>
-              <a:gd name="adj1" fmla="val -13259"/>
-              <a:gd name="adj2" fmla="val -214398"/>
+              <a:gd name="adj1" fmla="val 17923"/>
+              <a:gd name="adj2" fmla="val -319116"/>
             </a:avLst>
           </a:prstGeom>
           <a:solidFill>
@@ -4101,12 +4101,12 @@
         <p:spPr>
           <a:xfrm>
             <a:off x="4269906" y="3450245"/>
-            <a:ext cx="771908" cy="334252"/>
+            <a:ext cx="984084" cy="340079"/>
           </a:xfrm>
           <a:prstGeom prst="wedgeRectCallout">
             <a:avLst>
-              <a:gd name="adj1" fmla="val -92233"/>
-              <a:gd name="adj2" fmla="val -217250"/>
+              <a:gd name="adj1" fmla="val -39327"/>
+              <a:gd name="adj2" fmla="val -317600"/>
             </a:avLst>
           </a:prstGeom>
           <a:solidFill>
@@ -4146,6 +4146,16 @@
           <a:p>
             <a:pPr algn="ctr"/>
             <a:r>
+              <a:rPr lang="de-DE" sz="1000" dirty="0" smtClean="0">
+                <a:solidFill>
+                  <a:schemeClr val="accent1">
+                    <a:lumMod val="75000"/>
+                  </a:schemeClr>
+                </a:solidFill>
+              </a:rPr>
+              <a:t>form </a:t>
+            </a:r>
+            <a:r>
               <a:rPr lang="de-DE" sz="1000" dirty="0" err="1" smtClean="0">
                 <a:solidFill>
                   <a:schemeClr val="accent1">
@@ -4153,7 +4163,36 @@
                   </a:schemeClr>
                 </a:solidFill>
               </a:rPr>
-              <a:t>control</a:t>
+              <a:t>element</a:t>
+            </a:r>
+            <a:r>
+              <a:rPr lang="de-DE" sz="1000" dirty="0" smtClean="0">
+                <a:solidFill>
+                  <a:schemeClr val="accent1">
+                    <a:lumMod val="75000"/>
+                  </a:schemeClr>
+                </a:solidFill>
+              </a:rPr>
+              <a:t/>
+            </a:r>
+            <a:br>
+              <a:rPr lang="de-DE" sz="1000" dirty="0" smtClean="0">
+                <a:solidFill>
+                  <a:schemeClr val="accent1">
+                    <a:lumMod val="75000"/>
+                  </a:schemeClr>
+                </a:solidFill>
+              </a:rPr>
+            </a:br>
+            <a:r>
+              <a:rPr lang="de-DE" sz="1000" dirty="0" err="1" smtClean="0">
+                <a:solidFill>
+                  <a:schemeClr val="accent1">
+                    <a:lumMod val="75000"/>
+                  </a:schemeClr>
+                </a:solidFill>
+              </a:rPr>
+              <a:t>grid</a:t>
             </a:r>
             <a:r>
               <a:rPr lang="de-DE" sz="1000" dirty="0" smtClean="0">
@@ -4166,16 +4205,6 @@
               <a:t> </a:t>
             </a:r>
             <a:r>
-              <a:rPr lang="de-DE" sz="1000" dirty="0" err="1" smtClean="0">
-                <a:solidFill>
-                  <a:schemeClr val="accent1">
-                    <a:lumMod val="75000"/>
-                  </a:schemeClr>
-                </a:solidFill>
-              </a:rPr>
-              <a:t>grid</a:t>
-            </a:r>
-            <a:r>
               <a:rPr lang="de-DE" sz="1000" dirty="0" smtClean="0">
                 <a:solidFill>
                   <a:schemeClr val="accent1">
@@ -4183,7 +4212,7 @@
                   </a:schemeClr>
                 </a:solidFill>
               </a:rPr>
-              <a:t> item</a:t>
+              <a:t>item</a:t>
             </a:r>
             <a:endParaRPr lang="de-DE" sz="1000" dirty="0">
               <a:solidFill>

</xml_diff>